<commit_message>
started replacing "choice" by "innovation". Will be a longer operation.
</commit_message>
<xml_diff>
--- a/extending/figures/modules.pptx
+++ b/extending/figures/modules.pptx
@@ -192,7 +192,7 @@
           <a:p>
             <a:fld id="{B331D21E-A933-4E39-927B-0A694CFD8A59}" type="datetimeFigureOut">
               <a:rPr lang="en-US" smtClean="0"/>
-              <a:t>3/18/2014</a:t>
+              <a:t>11/28/2014</a:t>
             </a:fld>
             <a:endParaRPr lang="en-US"/>
           </a:p>
@@ -765,7 +765,7 @@
           <a:p>
             <a:fld id="{4EAC39C6-F0CB-4B34-9E6A-ADED0510816B}" type="datetimeFigureOut">
               <a:rPr lang="en-US" smtClean="0"/>
-              <a:t>3/18/2014</a:t>
+              <a:t>11/28/2014</a:t>
             </a:fld>
             <a:endParaRPr lang="en-US"/>
           </a:p>
@@ -935,7 +935,7 @@
           <a:p>
             <a:fld id="{4EAC39C6-F0CB-4B34-9E6A-ADED0510816B}" type="datetimeFigureOut">
               <a:rPr lang="en-US" smtClean="0"/>
-              <a:t>3/18/2014</a:t>
+              <a:t>11/28/2014</a:t>
             </a:fld>
             <a:endParaRPr lang="en-US"/>
           </a:p>
@@ -1115,7 +1115,7 @@
           <a:p>
             <a:fld id="{4EAC39C6-F0CB-4B34-9E6A-ADED0510816B}" type="datetimeFigureOut">
               <a:rPr lang="en-US" smtClean="0"/>
-              <a:t>3/18/2014</a:t>
+              <a:t>11/28/2014</a:t>
             </a:fld>
             <a:endParaRPr lang="en-US"/>
           </a:p>
@@ -1285,7 +1285,7 @@
           <a:p>
             <a:fld id="{4EAC39C6-F0CB-4B34-9E6A-ADED0510816B}" type="datetimeFigureOut">
               <a:rPr lang="en-US" smtClean="0"/>
-              <a:t>3/18/2014</a:t>
+              <a:t>11/28/2014</a:t>
             </a:fld>
             <a:endParaRPr lang="en-US"/>
           </a:p>
@@ -1531,7 +1531,7 @@
           <a:p>
             <a:fld id="{4EAC39C6-F0CB-4B34-9E6A-ADED0510816B}" type="datetimeFigureOut">
               <a:rPr lang="en-US" smtClean="0"/>
-              <a:t>3/18/2014</a:t>
+              <a:t>11/28/2014</a:t>
             </a:fld>
             <a:endParaRPr lang="en-US"/>
           </a:p>
@@ -1819,7 +1819,7 @@
           <a:p>
             <a:fld id="{4EAC39C6-F0CB-4B34-9E6A-ADED0510816B}" type="datetimeFigureOut">
               <a:rPr lang="en-US" smtClean="0"/>
-              <a:t>3/18/2014</a:t>
+              <a:t>11/28/2014</a:t>
             </a:fld>
             <a:endParaRPr lang="en-US"/>
           </a:p>
@@ -2246,7 +2246,7 @@
           <a:p>
             <a:fld id="{4EAC39C6-F0CB-4B34-9E6A-ADED0510816B}" type="datetimeFigureOut">
               <a:rPr lang="en-US" smtClean="0"/>
-              <a:t>3/18/2014</a:t>
+              <a:t>11/28/2014</a:t>
             </a:fld>
             <a:endParaRPr lang="en-US"/>
           </a:p>
@@ -2364,7 +2364,7 @@
           <a:p>
             <a:fld id="{4EAC39C6-F0CB-4B34-9E6A-ADED0510816B}" type="datetimeFigureOut">
               <a:rPr lang="en-US" smtClean="0"/>
-              <a:t>3/18/2014</a:t>
+              <a:t>11/28/2014</a:t>
             </a:fld>
             <a:endParaRPr lang="en-US"/>
           </a:p>
@@ -2459,7 +2459,7 @@
           <a:p>
             <a:fld id="{4EAC39C6-F0CB-4B34-9E6A-ADED0510816B}" type="datetimeFigureOut">
               <a:rPr lang="en-US" smtClean="0"/>
-              <a:t>3/18/2014</a:t>
+              <a:t>11/28/2014</a:t>
             </a:fld>
             <a:endParaRPr lang="en-US"/>
           </a:p>
@@ -2736,7 +2736,7 @@
           <a:p>
             <a:fld id="{4EAC39C6-F0CB-4B34-9E6A-ADED0510816B}" type="datetimeFigureOut">
               <a:rPr lang="en-US" smtClean="0"/>
-              <a:t>3/18/2014</a:t>
+              <a:t>11/28/2014</a:t>
             </a:fld>
             <a:endParaRPr lang="en-US"/>
           </a:p>
@@ -2989,7 +2989,7 @@
           <a:p>
             <a:fld id="{4EAC39C6-F0CB-4B34-9E6A-ADED0510816B}" type="datetimeFigureOut">
               <a:rPr lang="en-US" smtClean="0"/>
-              <a:t>3/18/2014</a:t>
+              <a:t>11/28/2014</a:t>
             </a:fld>
             <a:endParaRPr lang="en-US"/>
           </a:p>
@@ -3202,7 +3202,7 @@
           <a:p>
             <a:fld id="{4EAC39C6-F0CB-4B34-9E6A-ADED0510816B}" type="datetimeFigureOut">
               <a:rPr lang="en-US" smtClean="0"/>
-              <a:t>3/18/2014</a:t>
+              <a:t>11/28/2014</a:t>
             </a:fld>
             <a:endParaRPr lang="en-US"/>
           </a:p>
@@ -6369,7 +6369,7 @@
         <p:spPr bwMode="auto">
           <a:xfrm>
             <a:off x="3901376" y="6990767"/>
-            <a:ext cx="881199" cy="461966"/>
+            <a:ext cx="983509" cy="438260"/>
           </a:xfrm>
           <a:prstGeom prst="roundRect">
             <a:avLst/>
@@ -6529,10 +6529,10 @@
           <a:p>
             <a:pPr algn="ctr" eaLnBrk="1" hangingPunct="1"/>
             <a:r>
-              <a:rPr lang="en-US" altLang="en-US" sz="1200" dirty="0" smtClean="0">
+              <a:rPr lang="en-US" altLang="en-US" sz="1200" dirty="0">
                 <a:cs typeface="Arial" charset="0"/>
               </a:rPr>
-              <a:t>choice</a:t>
+              <a:t>innovation</a:t>
             </a:r>
             <a:endParaRPr lang="en-US" altLang="en-US" sz="1200" dirty="0">
               <a:cs typeface="Arial" charset="0"/>
@@ -6548,10 +6548,10 @@
         </p:nvGrpSpPr>
         <p:grpSpPr>
           <a:xfrm>
-            <a:off x="3970281" y="5796384"/>
-            <a:ext cx="881199" cy="1038030"/>
-            <a:chOff x="457939" y="4797152"/>
-            <a:chExt cx="881199" cy="1038030"/>
+            <a:off x="3901377" y="5796384"/>
+            <a:ext cx="950104" cy="1038030"/>
+            <a:chOff x="389035" y="4797152"/>
+            <a:chExt cx="950104" cy="1038030"/>
           </a:xfrm>
         </p:grpSpPr>
         <p:pic>
@@ -6603,8 +6603,8 @@
           </p:nvSpPr>
           <p:spPr bwMode="auto">
             <a:xfrm>
-              <a:off x="457939" y="5373216"/>
-              <a:ext cx="881199" cy="461966"/>
+              <a:off x="389035" y="5373216"/>
+              <a:ext cx="950104" cy="461966"/>
             </a:xfrm>
             <a:prstGeom prst="roundRect">
               <a:avLst/>
@@ -6761,7 +6761,7 @@
                 <a:rPr lang="en-US" altLang="en-US" sz="1200" dirty="0" smtClean="0">
                   <a:cs typeface="Arial" charset="0"/>
                 </a:rPr>
-                <a:t>choice</a:t>
+                <a:t>innovation</a:t>
               </a:r>
               <a:endParaRPr lang="en-US" altLang="en-US" sz="1200" dirty="0">
                 <a:cs typeface="Arial" charset="0"/>
@@ -6779,7 +6779,7 @@
         <p:spPr bwMode="auto">
           <a:xfrm>
             <a:off x="3185815" y="7198044"/>
-            <a:ext cx="881199" cy="461966"/>
+            <a:ext cx="946232" cy="461966"/>
           </a:xfrm>
           <a:prstGeom prst="roundRect">
             <a:avLst/>
@@ -6933,10 +6933,10 @@
           <a:p>
             <a:pPr algn="ctr" eaLnBrk="1" hangingPunct="1"/>
             <a:r>
-              <a:rPr lang="en-US" altLang="en-US" sz="1200" dirty="0" smtClean="0">
+              <a:rPr lang="en-US" altLang="en-US" sz="1200" dirty="0">
                 <a:cs typeface="Arial" charset="0"/>
               </a:rPr>
-              <a:t>choice</a:t>
+              <a:t>innovation</a:t>
             </a:r>
             <a:endParaRPr lang="en-US" altLang="en-US" sz="1200" dirty="0">
               <a:cs typeface="Arial" charset="0"/>
@@ -8714,10 +8714,10 @@
         </p:nvGrpSpPr>
         <p:grpSpPr>
           <a:xfrm>
-            <a:off x="4793577" y="5853433"/>
-            <a:ext cx="881199" cy="1038030"/>
+            <a:off x="4793576" y="5853433"/>
+            <a:ext cx="1176917" cy="1038030"/>
             <a:chOff x="457939" y="4797152"/>
-            <a:chExt cx="881199" cy="1038030"/>
+            <a:chExt cx="1010290" cy="1038030"/>
           </a:xfrm>
         </p:grpSpPr>
         <p:pic>
@@ -8770,7 +8770,7 @@
           <p:spPr bwMode="auto">
             <a:xfrm>
               <a:off x="457939" y="5373216"/>
-              <a:ext cx="881199" cy="461966"/>
+              <a:ext cx="1010290" cy="461966"/>
             </a:xfrm>
             <a:prstGeom prst="roundRect">
               <a:avLst/>
@@ -8927,7 +8927,7 @@
                 <a:rPr lang="en-US" altLang="en-US" sz="1200" dirty="0" smtClean="0">
                   <a:cs typeface="Arial" charset="0"/>
                 </a:rPr>
-                <a:t>choice</a:t>
+                <a:t>innovation</a:t>
               </a:r>
               <a:endParaRPr lang="en-US" altLang="en-US" sz="1200" dirty="0">
                 <a:cs typeface="Arial" charset="0"/>

</xml_diff>

<commit_message>
adapting figures with missing modules
</commit_message>
<xml_diff>
--- a/extending/figures/modules.pptx
+++ b/extending/figures/modules.pptx
@@ -5411,242 +5411,227 @@
           </p:txBody>
         </p:sp>
       </p:grpSp>
-      <p:grpSp>
-        <p:nvGrpSpPr>
-          <p:cNvPr id="30" name="Group 29"/>
-          <p:cNvGrpSpPr/>
+      <p:pic>
+        <p:nvPicPr>
+          <p:cNvPr id="31" name="Picture 4" descr="C:\Users\anhorni\Desktop\Picture1.png"/>
+          <p:cNvPicPr>
+            <a:picLocks noChangeAspect="1" noChangeArrowheads="1"/>
+          </p:cNvPicPr>
           <p:nvPr/>
-        </p:nvGrpSpPr>
-        <p:grpSpPr>
-          <a:xfrm>
-            <a:off x="568258" y="3580539"/>
-            <a:ext cx="819411" cy="1038030"/>
-            <a:chOff x="457939" y="4797152"/>
-            <a:chExt cx="819411" cy="1038030"/>
-          </a:xfrm>
-        </p:grpSpPr>
-        <p:pic>
-          <p:nvPicPr>
-            <p:cNvPr id="31" name="Picture 4" descr="C:\Users\anhorni\Desktop\Picture1.png"/>
-            <p:cNvPicPr>
-              <a:picLocks noChangeAspect="1" noChangeArrowheads="1"/>
-            </p:cNvPicPr>
-            <p:nvPr/>
-          </p:nvPicPr>
-          <p:blipFill>
-            <a:blip r:embed="rId3">
-              <a:extLst>
-                <a:ext uri="{28A0092B-C50C-407E-A947-70E740481C1C}">
-                  <a14:useLocalDpi xmlns:a14="http://schemas.microsoft.com/office/drawing/2010/main" val="0"/>
-                </a:ext>
-              </a:extLst>
-            </a:blip>
-            <a:srcRect/>
-            <a:stretch>
-              <a:fillRect/>
-            </a:stretch>
-          </p:blipFill>
-          <p:spPr bwMode="auto">
-            <a:xfrm rot="16200000">
-              <a:off x="420136" y="4955108"/>
-              <a:ext cx="712787" cy="396875"/>
-            </a:xfrm>
-            <a:prstGeom prst="rect">
-              <a:avLst/>
-            </a:prstGeom>
-            <a:noFill/>
+        </p:nvPicPr>
+        <p:blipFill>
+          <a:blip r:embed="rId3">
             <a:extLst>
-              <a:ext uri="{909E8E84-426E-40DD-AFC4-6F175D3DCCD1}">
-                <a14:hiddenFill xmlns:a14="http://schemas.microsoft.com/office/drawing/2010/main">
-                  <a:solidFill>
-                    <a:srgbClr val="FFFFFF"/>
-                  </a:solidFill>
-                </a14:hiddenFill>
+              <a:ext uri="{28A0092B-C50C-407E-A947-70E740481C1C}">
+                <a14:useLocalDpi xmlns:a14="http://schemas.microsoft.com/office/drawing/2010/main" val="0"/>
               </a:ext>
             </a:extLst>
-          </p:spPr>
-        </p:pic>
-        <p:sp>
-          <p:nvSpPr>
-            <p:cNvPr id="32" name="Rounded Rectangle 31"/>
-            <p:cNvSpPr/>
-            <p:nvPr/>
-          </p:nvSpPr>
-          <p:spPr bwMode="auto">
-            <a:xfrm>
-              <a:off x="457939" y="5373216"/>
-              <a:ext cx="819411" cy="461966"/>
-            </a:xfrm>
-            <a:prstGeom prst="roundRect">
-              <a:avLst/>
-            </a:prstGeom>
+          </a:blip>
+          <a:srcRect/>
+          <a:stretch>
+            <a:fillRect/>
+          </a:stretch>
+        </p:blipFill>
+        <p:spPr bwMode="auto">
+          <a:xfrm rot="16200000">
+            <a:off x="530455" y="3738495"/>
+            <a:ext cx="712787" cy="396875"/>
+          </a:xfrm>
+          <a:prstGeom prst="rect">
+            <a:avLst/>
+          </a:prstGeom>
+          <a:noFill/>
+          <a:extLst>
+            <a:ext uri="{909E8E84-426E-40DD-AFC4-6F175D3DCCD1}">
+              <a14:hiddenFill xmlns:a14="http://schemas.microsoft.com/office/drawing/2010/main">
+                <a:solidFill>
+                  <a:srgbClr val="FFFFFF"/>
+                </a:solidFill>
+              </a14:hiddenFill>
+            </a:ext>
+          </a:extLst>
+        </p:spPr>
+      </p:pic>
+      <p:sp>
+        <p:nvSpPr>
+          <p:cNvPr id="32" name="Rounded Rectangle 31"/>
+          <p:cNvSpPr/>
+          <p:nvPr/>
+        </p:nvSpPr>
+        <p:spPr bwMode="auto">
+          <a:xfrm>
+            <a:off x="147333" y="4156602"/>
+            <a:ext cx="1830820" cy="703677"/>
+          </a:xfrm>
+          <a:prstGeom prst="roundRect">
+            <a:avLst/>
+          </a:prstGeom>
+          <a:solidFill>
+            <a:schemeClr val="bg1"/>
+          </a:solidFill>
+          <a:ln w="19050" cap="flat" cmpd="sng" algn="ctr">
             <a:solidFill>
-              <a:schemeClr val="bg1"/>
+              <a:schemeClr val="tx1"/>
             </a:solidFill>
-            <a:ln w="19050" cap="flat" cmpd="sng" algn="ctr">
-              <a:solidFill>
-                <a:schemeClr val="tx1"/>
-              </a:solidFill>
-              <a:prstDash val="solid"/>
-              <a:round/>
-              <a:headEnd type="none" w="med" len="med"/>
-              <a:tailEnd type="none" w="med" len="med"/>
-            </a:ln>
-            <a:effectLst/>
-          </p:spPr>
-          <p:style>
-            <a:lnRef idx="1">
-              <a:schemeClr val="accent1"/>
-            </a:lnRef>
-            <a:fillRef idx="3">
-              <a:schemeClr val="accent1"/>
-            </a:fillRef>
-            <a:effectRef idx="2">
-              <a:schemeClr val="accent1"/>
-            </a:effectRef>
-            <a:fontRef idx="minor">
-              <a:schemeClr val="lt1"/>
-            </a:fontRef>
-          </p:style>
-          <p:txBody>
-            <a:bodyPr anchor="ctr"/>
-            <a:lstStyle>
-              <a:lvl1pPr eaLnBrk="0" hangingPunct="0">
-                <a:defRPr sz="2400">
-                  <a:solidFill>
-                    <a:schemeClr val="tx1"/>
-                  </a:solidFill>
-                  <a:latin typeface="Arial" charset="0"/>
-                  <a:ea typeface="ＭＳ Ｐゴシック" charset="-128"/>
-                </a:defRPr>
-              </a:lvl1pPr>
-              <a:lvl2pPr marL="37931725" indent="-37474525" eaLnBrk="0" hangingPunct="0">
-                <a:defRPr sz="2400">
-                  <a:solidFill>
-                    <a:schemeClr val="tx1"/>
-                  </a:solidFill>
-                  <a:latin typeface="Arial" charset="0"/>
-                  <a:ea typeface="ＭＳ Ｐゴシック" charset="-128"/>
-                </a:defRPr>
-              </a:lvl2pPr>
-              <a:lvl3pPr eaLnBrk="0" hangingPunct="0">
-                <a:defRPr sz="2400">
-                  <a:solidFill>
-                    <a:schemeClr val="tx1"/>
-                  </a:solidFill>
-                  <a:latin typeface="Arial" charset="0"/>
-                  <a:ea typeface="ＭＳ Ｐゴシック" charset="-128"/>
-                </a:defRPr>
-              </a:lvl3pPr>
-              <a:lvl4pPr eaLnBrk="0" hangingPunct="0">
-                <a:defRPr sz="2400">
-                  <a:solidFill>
-                    <a:schemeClr val="tx1"/>
-                  </a:solidFill>
-                  <a:latin typeface="Arial" charset="0"/>
-                  <a:ea typeface="ＭＳ Ｐゴシック" charset="-128"/>
-                </a:defRPr>
-              </a:lvl4pPr>
-              <a:lvl5pPr eaLnBrk="0" hangingPunct="0">
-                <a:defRPr sz="2400">
-                  <a:solidFill>
-                    <a:schemeClr val="tx1"/>
-                  </a:solidFill>
-                  <a:latin typeface="Arial" charset="0"/>
-                  <a:ea typeface="ＭＳ Ｐゴシック" charset="-128"/>
-                </a:defRPr>
-              </a:lvl5pPr>
-              <a:lvl6pPr marL="457200" eaLnBrk="0" fontAlgn="base" hangingPunct="0">
-                <a:spcBef>
-                  <a:spcPct val="0"/>
-                </a:spcBef>
-                <a:spcAft>
-                  <a:spcPct val="0"/>
-                </a:spcAft>
-                <a:defRPr sz="2400">
-                  <a:solidFill>
-                    <a:schemeClr val="tx1"/>
-                  </a:solidFill>
-                  <a:latin typeface="Arial" charset="0"/>
-                  <a:ea typeface="ＭＳ Ｐゴシック" charset="-128"/>
-                </a:defRPr>
-              </a:lvl6pPr>
-              <a:lvl7pPr marL="914400" eaLnBrk="0" fontAlgn="base" hangingPunct="0">
-                <a:spcBef>
-                  <a:spcPct val="0"/>
-                </a:spcBef>
-                <a:spcAft>
-                  <a:spcPct val="0"/>
-                </a:spcAft>
-                <a:defRPr sz="2400">
-                  <a:solidFill>
-                    <a:schemeClr val="tx1"/>
-                  </a:solidFill>
-                  <a:latin typeface="Arial" charset="0"/>
-                  <a:ea typeface="ＭＳ Ｐゴシック" charset="-128"/>
-                </a:defRPr>
-              </a:lvl7pPr>
-              <a:lvl8pPr marL="1371600" eaLnBrk="0" fontAlgn="base" hangingPunct="0">
-                <a:spcBef>
-                  <a:spcPct val="0"/>
-                </a:spcBef>
-                <a:spcAft>
-                  <a:spcPct val="0"/>
-                </a:spcAft>
-                <a:defRPr sz="2400">
-                  <a:solidFill>
-                    <a:schemeClr val="tx1"/>
-                  </a:solidFill>
-                  <a:latin typeface="Arial" charset="0"/>
-                  <a:ea typeface="ＭＳ Ｐゴシック" charset="-128"/>
-                </a:defRPr>
-              </a:lvl8pPr>
-              <a:lvl9pPr marL="1828800" eaLnBrk="0" fontAlgn="base" hangingPunct="0">
-                <a:spcBef>
-                  <a:spcPct val="0"/>
-                </a:spcBef>
-                <a:spcAft>
-                  <a:spcPct val="0"/>
-                </a:spcAft>
-                <a:defRPr sz="2400">
-                  <a:solidFill>
-                    <a:schemeClr val="tx1"/>
-                  </a:solidFill>
-                  <a:latin typeface="Arial" charset="0"/>
-                  <a:ea typeface="ＭＳ Ｐゴシック" charset="-128"/>
-                </a:defRPr>
-              </a:lvl9pPr>
-            </a:lstStyle>
-            <a:p>
-              <a:pPr algn="ctr" eaLnBrk="1" hangingPunct="1"/>
-              <a:r>
-                <a:rPr lang="en-US" altLang="en-US" sz="1200" b="1" dirty="0">
-                  <a:cs typeface="Arial" charset="0"/>
-                </a:rPr>
-                <a:t>n</a:t>
-              </a:r>
-              <a:r>
-                <a:rPr lang="en-US" altLang="en-US" sz="1200" b="1" dirty="0" smtClean="0">
-                  <a:cs typeface="Arial" charset="0"/>
-                </a:rPr>
-                <a:t>etwork</a:t>
-              </a:r>
-            </a:p>
-            <a:p>
-              <a:pPr algn="ctr" eaLnBrk="1" hangingPunct="1"/>
-              <a:r>
-                <a:rPr lang="en-US" altLang="en-US" sz="1200" b="1" dirty="0" smtClean="0">
-                  <a:cs typeface="Arial" charset="0"/>
-                </a:rPr>
-                <a:t>editors</a:t>
-              </a:r>
-              <a:endParaRPr lang="en-US" altLang="en-US" sz="1200" b="1" dirty="0">
+            <a:prstDash val="solid"/>
+            <a:round/>
+            <a:headEnd type="none" w="med" len="med"/>
+            <a:tailEnd type="none" w="med" len="med"/>
+          </a:ln>
+          <a:effectLst/>
+        </p:spPr>
+        <p:style>
+          <a:lnRef idx="1">
+            <a:schemeClr val="accent1"/>
+          </a:lnRef>
+          <a:fillRef idx="3">
+            <a:schemeClr val="accent1"/>
+          </a:fillRef>
+          <a:effectRef idx="2">
+            <a:schemeClr val="accent1"/>
+          </a:effectRef>
+          <a:fontRef idx="minor">
+            <a:schemeClr val="lt1"/>
+          </a:fontRef>
+        </p:style>
+        <p:txBody>
+          <a:bodyPr anchor="ctr"/>
+          <a:lstStyle>
+            <a:lvl1pPr eaLnBrk="0" hangingPunct="0">
+              <a:defRPr sz="2400">
+                <a:solidFill>
+                  <a:schemeClr val="tx1"/>
+                </a:solidFill>
+                <a:latin typeface="Arial" charset="0"/>
+                <a:ea typeface="ＭＳ Ｐゴシック" charset="-128"/>
+              </a:defRPr>
+            </a:lvl1pPr>
+            <a:lvl2pPr marL="37931725" indent="-37474525" eaLnBrk="0" hangingPunct="0">
+              <a:defRPr sz="2400">
+                <a:solidFill>
+                  <a:schemeClr val="tx1"/>
+                </a:solidFill>
+                <a:latin typeface="Arial" charset="0"/>
+                <a:ea typeface="ＭＳ Ｐゴシック" charset="-128"/>
+              </a:defRPr>
+            </a:lvl2pPr>
+            <a:lvl3pPr eaLnBrk="0" hangingPunct="0">
+              <a:defRPr sz="2400">
+                <a:solidFill>
+                  <a:schemeClr val="tx1"/>
+                </a:solidFill>
+                <a:latin typeface="Arial" charset="0"/>
+                <a:ea typeface="ＭＳ Ｐゴシック" charset="-128"/>
+              </a:defRPr>
+            </a:lvl3pPr>
+            <a:lvl4pPr eaLnBrk="0" hangingPunct="0">
+              <a:defRPr sz="2400">
+                <a:solidFill>
+                  <a:schemeClr val="tx1"/>
+                </a:solidFill>
+                <a:latin typeface="Arial" charset="0"/>
+                <a:ea typeface="ＭＳ Ｐゴシック" charset="-128"/>
+              </a:defRPr>
+            </a:lvl4pPr>
+            <a:lvl5pPr eaLnBrk="0" hangingPunct="0">
+              <a:defRPr sz="2400">
+                <a:solidFill>
+                  <a:schemeClr val="tx1"/>
+                </a:solidFill>
+                <a:latin typeface="Arial" charset="0"/>
+                <a:ea typeface="ＭＳ Ｐゴシック" charset="-128"/>
+              </a:defRPr>
+            </a:lvl5pPr>
+            <a:lvl6pPr marL="457200" eaLnBrk="0" fontAlgn="base" hangingPunct="0">
+              <a:spcBef>
+                <a:spcPct val="0"/>
+              </a:spcBef>
+              <a:spcAft>
+                <a:spcPct val="0"/>
+              </a:spcAft>
+              <a:defRPr sz="2400">
+                <a:solidFill>
+                  <a:schemeClr val="tx1"/>
+                </a:solidFill>
+                <a:latin typeface="Arial" charset="0"/>
+                <a:ea typeface="ＭＳ Ｐゴシック" charset="-128"/>
+              </a:defRPr>
+            </a:lvl6pPr>
+            <a:lvl7pPr marL="914400" eaLnBrk="0" fontAlgn="base" hangingPunct="0">
+              <a:spcBef>
+                <a:spcPct val="0"/>
+              </a:spcBef>
+              <a:spcAft>
+                <a:spcPct val="0"/>
+              </a:spcAft>
+              <a:defRPr sz="2400">
+                <a:solidFill>
+                  <a:schemeClr val="tx1"/>
+                </a:solidFill>
+                <a:latin typeface="Arial" charset="0"/>
+                <a:ea typeface="ＭＳ Ｐゴシック" charset="-128"/>
+              </a:defRPr>
+            </a:lvl7pPr>
+            <a:lvl8pPr marL="1371600" eaLnBrk="0" fontAlgn="base" hangingPunct="0">
+              <a:spcBef>
+                <a:spcPct val="0"/>
+              </a:spcBef>
+              <a:spcAft>
+                <a:spcPct val="0"/>
+              </a:spcAft>
+              <a:defRPr sz="2400">
+                <a:solidFill>
+                  <a:schemeClr val="tx1"/>
+                </a:solidFill>
+                <a:latin typeface="Arial" charset="0"/>
+                <a:ea typeface="ＭＳ Ｐゴシック" charset="-128"/>
+              </a:defRPr>
+            </a:lvl8pPr>
+            <a:lvl9pPr marL="1828800" eaLnBrk="0" fontAlgn="base" hangingPunct="0">
+              <a:spcBef>
+                <a:spcPct val="0"/>
+              </a:spcBef>
+              <a:spcAft>
+                <a:spcPct val="0"/>
+              </a:spcAft>
+              <a:defRPr sz="2400">
+                <a:solidFill>
+                  <a:schemeClr val="tx1"/>
+                </a:solidFill>
+                <a:latin typeface="Arial" charset="0"/>
+                <a:ea typeface="ＭＳ Ｐゴシック" charset="-128"/>
+              </a:defRPr>
+            </a:lvl9pPr>
+          </a:lstStyle>
+          <a:p>
+            <a:pPr eaLnBrk="1" hangingPunct="1"/>
+            <a:r>
+              <a:rPr lang="en-US" altLang="en-US" sz="1200" b="1" dirty="0">
                 <a:cs typeface="Arial" charset="0"/>
-              </a:endParaRPr>
-            </a:p>
-          </p:txBody>
-        </p:sp>
-      </p:grpSp>
+              </a:rPr>
+              <a:t>n</a:t>
+            </a:r>
+            <a:r>
+              <a:rPr lang="en-US" altLang="en-US" sz="1200" b="1" dirty="0" smtClean="0">
+                <a:cs typeface="Arial" charset="0"/>
+              </a:rPr>
+              <a:t>etwork editors</a:t>
+            </a:r>
+          </a:p>
+          <a:p>
+            <a:pPr eaLnBrk="1" hangingPunct="1"/>
+            <a:r>
+              <a:rPr lang="en-US" altLang="en-US" sz="1200" b="1" dirty="0" err="1" smtClean="0">
+                <a:cs typeface="Arial" charset="0"/>
+              </a:rPr>
+              <a:t>freightChainsFromTD</a:t>
+            </a:r>
+            <a:endParaRPr lang="en-US" altLang="en-US" sz="1200" b="1" dirty="0">
+              <a:cs typeface="Arial" charset="0"/>
+            </a:endParaRPr>
+          </a:p>
+        </p:txBody>
+      </p:sp>
       <p:pic>
         <p:nvPicPr>
           <p:cNvPr id="33" name="Picture 3" descr="C:\Users\anhorni\Desktop\logitech-laptop-headset-h555.png"/>
@@ -6312,9 +6297,6 @@
                 </a:rPr>
                 <a:t>scoring</a:t>
               </a:r>
-              <a:endParaRPr lang="en-US" altLang="en-US" sz="1200" b="1" dirty="0" smtClean="0">
-                <a:cs typeface="Arial" charset="0"/>
-              </a:endParaRPr>
             </a:p>
           </p:txBody>
         </p:sp>
@@ -6806,13 +6788,7 @@
               <a:rPr lang="en-US" altLang="en-US" sz="1200" b="1" dirty="0" smtClean="0">
                 <a:cs typeface="Arial" charset="0"/>
               </a:rPr>
-              <a:t>t</a:t>
-            </a:r>
-            <a:r>
-              <a:rPr lang="en-US" altLang="en-US" sz="1200" b="1" dirty="0" smtClean="0">
-                <a:cs typeface="Arial" charset="0"/>
-              </a:rPr>
-              <a:t>ravel time calculator</a:t>
+              <a:t>travel time calculator</a:t>
             </a:r>
           </a:p>
         </p:txBody>
@@ -7165,9 +7141,6 @@
               </a:rPr>
               <a:t>electric vehicles</a:t>
             </a:r>
-            <a:endParaRPr lang="en-US" altLang="en-US" sz="1200" b="1" dirty="0" smtClean="0">
-              <a:cs typeface="Arial" charset="0"/>
-            </a:endParaRPr>
           </a:p>
           <a:p>
             <a:pPr eaLnBrk="1" hangingPunct="1"/>
@@ -7184,13 +7157,7 @@
               <a:rPr lang="en-US" altLang="en-US" sz="1200" b="1" dirty="0" err="1" smtClean="0">
                 <a:cs typeface="Arial" charset="0"/>
               </a:rPr>
-              <a:t>c</a:t>
-            </a:r>
-            <a:r>
-              <a:rPr lang="en-US" altLang="en-US" sz="1200" b="1" dirty="0" err="1" smtClean="0">
-                <a:cs typeface="Arial" charset="0"/>
-              </a:rPr>
-              <a:t>adyts</a:t>
+              <a:t>cadyts</a:t>
             </a:r>
             <a:endParaRPr lang="en-US" altLang="en-US" sz="1200" b="1" dirty="0" smtClean="0">
               <a:cs typeface="Arial" charset="0"/>
@@ -7260,8 +7227,8 @@
         </p:nvSpPr>
         <p:spPr bwMode="auto">
           <a:xfrm>
-            <a:off x="7220089" y="954029"/>
-            <a:ext cx="1547163" cy="1271134"/>
+            <a:off x="7220089" y="323776"/>
+            <a:ext cx="1547163" cy="1901387"/>
           </a:xfrm>
           <a:prstGeom prst="roundRect">
             <a:avLst/>
@@ -7484,8 +7451,26 @@
               <a:rPr lang="en-US" altLang="en-US" sz="1200" b="1" dirty="0" smtClean="0">
                 <a:cs typeface="Arial" charset="0"/>
               </a:rPr>
-              <a:t>ink stats</a:t>
-            </a:r>
+              <a:t>ink </a:t>
+            </a:r>
+            <a:r>
+              <a:rPr lang="en-US" altLang="en-US" sz="1200" b="1" dirty="0" smtClean="0">
+                <a:cs typeface="Arial" charset="0"/>
+              </a:rPr>
+              <a:t>stats</a:t>
+            </a:r>
+          </a:p>
+          <a:p>
+            <a:pPr eaLnBrk="1" hangingPunct="1"/>
+            <a:r>
+              <a:rPr lang="en-US" altLang="en-US" sz="1200" b="1" dirty="0" smtClean="0">
+                <a:cs typeface="Arial" charset="0"/>
+              </a:rPr>
+              <a:t>analysis</a:t>
+            </a:r>
+            <a:endParaRPr lang="en-US" altLang="en-US" sz="1200" b="1" dirty="0" smtClean="0">
+              <a:cs typeface="Arial" charset="0"/>
+            </a:endParaRPr>
           </a:p>
         </p:txBody>
       </p:sp>
@@ -7539,7 +7524,7 @@
         <p:spPr bwMode="auto">
           <a:xfrm>
             <a:off x="3727529" y="7036922"/>
-            <a:ext cx="1592951" cy="798076"/>
+            <a:ext cx="1592951" cy="919702"/>
           </a:xfrm>
           <a:prstGeom prst="roundRect">
             <a:avLst/>
@@ -7748,8 +7733,8 @@
         </p:nvSpPr>
         <p:spPr bwMode="auto">
           <a:xfrm>
-            <a:off x="2534311" y="954028"/>
-            <a:ext cx="1193218" cy="1381295"/>
+            <a:off x="2534311" y="827832"/>
+            <a:ext cx="1193218" cy="1507491"/>
           </a:xfrm>
           <a:prstGeom prst="roundRect">
             <a:avLst/>
@@ -7966,17 +7951,8 @@
               <a:rPr lang="en-US" altLang="en-US" sz="1200" b="1" dirty="0" smtClean="0">
                 <a:cs typeface="Arial" charset="0"/>
               </a:rPr>
-              <a:t>l</a:t>
-            </a:r>
-            <a:r>
-              <a:rPr lang="en-US" altLang="en-US" sz="1200" b="1" dirty="0" smtClean="0">
-                <a:cs typeface="Arial" charset="0"/>
-              </a:rPr>
-              <a:t>anes</a:t>
-            </a:r>
-            <a:endParaRPr lang="en-US" altLang="en-US" sz="1200" b="1" dirty="0" smtClean="0">
-              <a:cs typeface="Arial" charset="0"/>
-            </a:endParaRPr>
+              <a:t>lanes</a:t>
+            </a:r>
           </a:p>
         </p:txBody>
       </p:sp>

</xml_diff>

<commit_message>
matrix based pt router
</commit_message>
<xml_diff>
--- a/extending/figures/modules.pptx
+++ b/extending/figures/modules.pptx
@@ -7451,13 +7451,7 @@
               <a:rPr lang="en-US" altLang="en-US" sz="1200" b="1" dirty="0" smtClean="0">
                 <a:cs typeface="Arial" charset="0"/>
               </a:rPr>
-              <a:t>ink </a:t>
-            </a:r>
-            <a:r>
-              <a:rPr lang="en-US" altLang="en-US" sz="1200" b="1" dirty="0" smtClean="0">
-                <a:cs typeface="Arial" charset="0"/>
-              </a:rPr>
-              <a:t>stats</a:t>
+              <a:t>ink stats</a:t>
             </a:r>
           </a:p>
           <a:p>
@@ -7468,9 +7462,6 @@
               </a:rPr>
               <a:t>analysis</a:t>
             </a:r>
-            <a:endParaRPr lang="en-US" altLang="en-US" sz="1200" b="1" dirty="0" smtClean="0">
-              <a:cs typeface="Arial" charset="0"/>
-            </a:endParaRPr>
           </a:p>
         </p:txBody>
       </p:sp>
@@ -7523,8 +7514,8 @@
         </p:nvSpPr>
         <p:spPr bwMode="auto">
           <a:xfrm>
-            <a:off x="3727529" y="7036922"/>
-            <a:ext cx="1592951" cy="919702"/>
+            <a:off x="3564458" y="7036922"/>
+            <a:ext cx="1994579" cy="1135726"/>
           </a:xfrm>
           <a:prstGeom prst="roundRect">
             <a:avLst/>
@@ -7717,7 +7708,34 @@
               <a:rPr lang="en-US" altLang="en-US" sz="1200" b="1" dirty="0" smtClean="0">
                 <a:cs typeface="Arial" charset="0"/>
               </a:rPr>
-              <a:t>selectors</a:t>
+              <a:t>Selectors</a:t>
+            </a:r>
+          </a:p>
+          <a:p>
+            <a:pPr eaLnBrk="1" hangingPunct="1"/>
+            <a:r>
+              <a:rPr lang="en-US" altLang="en-US" sz="1200" b="1" dirty="0">
+                <a:cs typeface="Arial" charset="0"/>
+              </a:rPr>
+              <a:t>m</a:t>
+            </a:r>
+            <a:r>
+              <a:rPr lang="en-US" altLang="en-US" sz="1200" b="1" dirty="0" smtClean="0">
+                <a:cs typeface="Arial" charset="0"/>
+              </a:rPr>
+              <a:t>atrix based </a:t>
+            </a:r>
+            <a:r>
+              <a:rPr lang="en-US" altLang="en-US" sz="1200" b="1" dirty="0" err="1" smtClean="0">
+                <a:cs typeface="Arial" charset="0"/>
+              </a:rPr>
+              <a:t>pt</a:t>
+            </a:r>
+            <a:r>
+              <a:rPr lang="en-US" altLang="en-US" sz="1200" b="1" dirty="0" smtClean="0">
+                <a:cs typeface="Arial" charset="0"/>
+              </a:rPr>
+              <a:t> router</a:t>
             </a:r>
             <a:endParaRPr lang="en-US" altLang="en-US" sz="1200" b="1" dirty="0">
               <a:cs typeface="Arial" charset="0"/>

</xml_diff>

<commit_message>
Module-Uebrsichtstabelle angepasst auf Subparts
</commit_message>
<xml_diff>
--- a/extending/figures/modules.pptx
+++ b/extending/figures/modules.pptx
@@ -192,7 +192,7 @@
           <a:p>
             <a:fld id="{B331D21E-A933-4E39-927B-0A694CFD8A59}" type="datetimeFigureOut">
               <a:rPr lang="en-US" smtClean="0"/>
-              <a:t>2/17/2015</a:t>
+              <a:t>1/1/2016</a:t>
             </a:fld>
             <a:endParaRPr lang="en-US"/>
           </a:p>
@@ -765,7 +765,7 @@
           <a:p>
             <a:fld id="{4EAC39C6-F0CB-4B34-9E6A-ADED0510816B}" type="datetimeFigureOut">
               <a:rPr lang="en-US" smtClean="0"/>
-              <a:t>2/17/2015</a:t>
+              <a:t>1/1/2016</a:t>
             </a:fld>
             <a:endParaRPr lang="en-US"/>
           </a:p>
@@ -935,7 +935,7 @@
           <a:p>
             <a:fld id="{4EAC39C6-F0CB-4B34-9E6A-ADED0510816B}" type="datetimeFigureOut">
               <a:rPr lang="en-US" smtClean="0"/>
-              <a:t>2/17/2015</a:t>
+              <a:t>1/1/2016</a:t>
             </a:fld>
             <a:endParaRPr lang="en-US"/>
           </a:p>
@@ -1115,7 +1115,7 @@
           <a:p>
             <a:fld id="{4EAC39C6-F0CB-4B34-9E6A-ADED0510816B}" type="datetimeFigureOut">
               <a:rPr lang="en-US" smtClean="0"/>
-              <a:t>2/17/2015</a:t>
+              <a:t>1/1/2016</a:t>
             </a:fld>
             <a:endParaRPr lang="en-US"/>
           </a:p>
@@ -1285,7 +1285,7 @@
           <a:p>
             <a:fld id="{4EAC39C6-F0CB-4B34-9E6A-ADED0510816B}" type="datetimeFigureOut">
               <a:rPr lang="en-US" smtClean="0"/>
-              <a:t>2/17/2015</a:t>
+              <a:t>1/1/2016</a:t>
             </a:fld>
             <a:endParaRPr lang="en-US"/>
           </a:p>
@@ -1531,7 +1531,7 @@
           <a:p>
             <a:fld id="{4EAC39C6-F0CB-4B34-9E6A-ADED0510816B}" type="datetimeFigureOut">
               <a:rPr lang="en-US" smtClean="0"/>
-              <a:t>2/17/2015</a:t>
+              <a:t>1/1/2016</a:t>
             </a:fld>
             <a:endParaRPr lang="en-US"/>
           </a:p>
@@ -1819,7 +1819,7 @@
           <a:p>
             <a:fld id="{4EAC39C6-F0CB-4B34-9E6A-ADED0510816B}" type="datetimeFigureOut">
               <a:rPr lang="en-US" smtClean="0"/>
-              <a:t>2/17/2015</a:t>
+              <a:t>1/1/2016</a:t>
             </a:fld>
             <a:endParaRPr lang="en-US"/>
           </a:p>
@@ -2246,7 +2246,7 @@
           <a:p>
             <a:fld id="{4EAC39C6-F0CB-4B34-9E6A-ADED0510816B}" type="datetimeFigureOut">
               <a:rPr lang="en-US" smtClean="0"/>
-              <a:t>2/17/2015</a:t>
+              <a:t>1/1/2016</a:t>
             </a:fld>
             <a:endParaRPr lang="en-US"/>
           </a:p>
@@ -2364,7 +2364,7 @@
           <a:p>
             <a:fld id="{4EAC39C6-F0CB-4B34-9E6A-ADED0510816B}" type="datetimeFigureOut">
               <a:rPr lang="en-US" smtClean="0"/>
-              <a:t>2/17/2015</a:t>
+              <a:t>1/1/2016</a:t>
             </a:fld>
             <a:endParaRPr lang="en-US"/>
           </a:p>
@@ -2459,7 +2459,7 @@
           <a:p>
             <a:fld id="{4EAC39C6-F0CB-4B34-9E6A-ADED0510816B}" type="datetimeFigureOut">
               <a:rPr lang="en-US" smtClean="0"/>
-              <a:t>2/17/2015</a:t>
+              <a:t>1/1/2016</a:t>
             </a:fld>
             <a:endParaRPr lang="en-US"/>
           </a:p>
@@ -2736,7 +2736,7 @@
           <a:p>
             <a:fld id="{4EAC39C6-F0CB-4B34-9E6A-ADED0510816B}" type="datetimeFigureOut">
               <a:rPr lang="en-US" smtClean="0"/>
-              <a:t>2/17/2015</a:t>
+              <a:t>1/1/2016</a:t>
             </a:fld>
             <a:endParaRPr lang="en-US"/>
           </a:p>
@@ -2989,7 +2989,7 @@
           <a:p>
             <a:fld id="{4EAC39C6-F0CB-4B34-9E6A-ADED0510816B}" type="datetimeFigureOut">
               <a:rPr lang="en-US" smtClean="0"/>
-              <a:t>2/17/2015</a:t>
+              <a:t>1/1/2016</a:t>
             </a:fld>
             <a:endParaRPr lang="en-US"/>
           </a:p>
@@ -3202,7 +3202,7 @@
           <a:p>
             <a:fld id="{4EAC39C6-F0CB-4B34-9E6A-ADED0510816B}" type="datetimeFigureOut">
               <a:rPr lang="en-US" smtClean="0"/>
-              <a:t>2/17/2015</a:t>
+              <a:t>1/1/2016</a:t>
             </a:fld>
             <a:endParaRPr lang="en-US"/>
           </a:p>
@@ -7705,11 +7705,20 @@
           <a:p>
             <a:pPr eaLnBrk="1" hangingPunct="1"/>
             <a:r>
-              <a:rPr lang="en-US" altLang="en-US" sz="1200" b="1" dirty="0" smtClean="0">
+              <a:rPr lang="en-US" altLang="en-US" sz="1200" b="1" dirty="0">
                 <a:cs typeface="Arial" charset="0"/>
               </a:rPr>
-              <a:t>Selectors</a:t>
-            </a:r>
+              <a:t>s</a:t>
+            </a:r>
+            <a:r>
+              <a:rPr lang="en-US" altLang="en-US" sz="1200" b="1" smtClean="0">
+                <a:cs typeface="Arial" charset="0"/>
+              </a:rPr>
+              <a:t>electors</a:t>
+            </a:r>
+            <a:endParaRPr lang="en-US" altLang="en-US" sz="1200" b="1" dirty="0" smtClean="0">
+              <a:cs typeface="Arial" charset="0"/>
+            </a:endParaRPr>
           </a:p>
           <a:p>
             <a:pPr eaLnBrk="1" hangingPunct="1"/>

</xml_diff>